<commit_message>
Rearranged quiz slide to different position
</commit_message>
<xml_diff>
--- a/lecture/Purr - tidyverse iterations.pptx
+++ b/lecture/Purr - tidyverse iterations.pptx
@@ -9,11 +9,11 @@
   </p:notesMasterIdLst>
   <p:sldIdLst>
     <p:sldId id="256" r:id="rId2"/>
-    <p:sldId id="257" r:id="rId3"/>
-    <p:sldId id="258" r:id="rId4"/>
-    <p:sldId id="259" r:id="rId5"/>
-    <p:sldId id="260" r:id="rId6"/>
-    <p:sldId id="261" r:id="rId7"/>
+    <p:sldId id="258" r:id="rId3"/>
+    <p:sldId id="259" r:id="rId4"/>
+    <p:sldId id="260" r:id="rId5"/>
+    <p:sldId id="261" r:id="rId6"/>
+    <p:sldId id="257" r:id="rId7"/>
     <p:sldId id="262" r:id="rId8"/>
     <p:sldId id="263" r:id="rId9"/>
     <p:sldId id="264" r:id="rId10"/>
@@ -220,7 +220,7 @@
           <a:p>
             <a:fld id="{5C93CA8F-50F8-44B5-B48F-4C4452AC4FCB}" type="datetimeFigureOut">
               <a:rPr lang="he-IL" smtClean="0"/>
-              <a:t>י'/סיון/תשע"ט</a:t>
+              <a:t>י"ח/סיון/תשע"ט</a:t>
             </a:fld>
             <a:endParaRPr lang="he-IL"/>
           </a:p>
@@ -6922,6 +6922,1127 @@
           <p:cNvPr id="2" name="Title 1">
             <a:extLst>
               <a:ext uri="{FF2B5EF4-FFF2-40B4-BE49-F238E27FC236}">
+                <a16:creationId xmlns:a16="http://schemas.microsoft.com/office/drawing/2014/main" id="{A2992973-ABCE-4744-94FF-8CEE1D8BFF8F}"/>
+              </a:ext>
+            </a:extLst>
+          </p:cNvPr>
+          <p:cNvSpPr>
+            <a:spLocks noGrp="1"/>
+          </p:cNvSpPr>
+          <p:nvPr>
+            <p:ph type="title"/>
+          </p:nvPr>
+        </p:nvSpPr>
+        <p:spPr/>
+        <p:txBody>
+          <a:bodyPr/>
+          <a:lstStyle/>
+          <a:p>
+            <a:r>
+              <a:rPr lang="en-US" dirty="0"/>
+              <a:t>Why </a:t>
+            </a:r>
+            <a:r>
+              <a:rPr lang="en-US" dirty="0" err="1"/>
+              <a:t>purrr</a:t>
+            </a:r>
+            <a:r>
+              <a:rPr lang="en-US" dirty="0"/>
+              <a:t>? </a:t>
+            </a:r>
+            <a:br>
+              <a:rPr lang="en-US" dirty="0"/>
+            </a:br>
+            <a:r>
+              <a:rPr lang="en-US" dirty="0"/>
+              <a:t>What is functional programming?</a:t>
+            </a:r>
+            <a:endParaRPr lang="en-IL" dirty="0"/>
+          </a:p>
+        </p:txBody>
+      </p:sp>
+      <p:sp>
+        <p:nvSpPr>
+          <p:cNvPr id="3" name="Content Placeholder 2">
+            <a:extLst>
+              <a:ext uri="{FF2B5EF4-FFF2-40B4-BE49-F238E27FC236}">
+                <a16:creationId xmlns:a16="http://schemas.microsoft.com/office/drawing/2014/main" id="{3D32442E-0F4D-4FDE-8312-B884AB1A08A6}"/>
+              </a:ext>
+            </a:extLst>
+          </p:cNvPr>
+          <p:cNvSpPr>
+            <a:spLocks noGrp="1"/>
+          </p:cNvSpPr>
+          <p:nvPr>
+            <p:ph idx="1"/>
+          </p:nvPr>
+        </p:nvSpPr>
+        <p:spPr/>
+        <p:txBody>
+          <a:bodyPr>
+            <a:normAutofit lnSpcReduction="10000"/>
+          </a:bodyPr>
+          <a:lstStyle/>
+          <a:p>
+            <a:r>
+              <a:rPr lang="en-US" sz="2400" dirty="0"/>
+              <a:t>“</a:t>
+            </a:r>
+            <a:r>
+              <a:rPr lang="en-US" sz="2400" i="1" dirty="0" err="1"/>
+              <a:t>purrr</a:t>
+            </a:r>
+            <a:r>
+              <a:rPr lang="en-US" sz="2400" i="1" dirty="0"/>
+              <a:t> enhances R’s functional programming (FP) toolkit by providing a complete and consistent set of tools for working with functions and vectors</a:t>
+            </a:r>
+            <a:r>
+              <a:rPr lang="en-US" sz="2400" dirty="0"/>
+              <a:t>”</a:t>
+            </a:r>
+          </a:p>
+          <a:p>
+            <a:pPr lvl="1"/>
+            <a:r>
+              <a:rPr lang="en-US" sz="2000" dirty="0" err="1"/>
+              <a:t>purrr’s</a:t>
+            </a:r>
+            <a:r>
+              <a:rPr lang="en-US" sz="2000" dirty="0"/>
+              <a:t> overview (</a:t>
+            </a:r>
+            <a:r>
+              <a:rPr lang="en-US" sz="2000" dirty="0">
+                <a:hlinkClick r:id="rId2"/>
+              </a:rPr>
+              <a:t>https://purrr.tidyverse.org/</a:t>
+            </a:r>
+            <a:r>
+              <a:rPr lang="en-US" sz="2000" dirty="0"/>
+              <a:t>)</a:t>
+            </a:r>
+            <a:endParaRPr lang="en-US" sz="2000" i="1" dirty="0"/>
+          </a:p>
+          <a:p>
+            <a:r>
+              <a:rPr lang="en-US" sz="2200" dirty="0"/>
+              <a:t>What makes a programming language “</a:t>
+            </a:r>
+            <a:r>
+              <a:rPr lang="en-US" sz="2200" i="1" dirty="0"/>
+              <a:t>functional</a:t>
+            </a:r>
+            <a:r>
+              <a:rPr lang="en-US" sz="2200" dirty="0"/>
+              <a:t>”?</a:t>
+            </a:r>
+          </a:p>
+          <a:p>
+            <a:pPr lvl="1"/>
+            <a:r>
+              <a:rPr lang="en-US" sz="2000" dirty="0"/>
+              <a:t>Functions behave like any other data structure (e.g. you can “pass them” as a variable)</a:t>
+            </a:r>
+          </a:p>
+          <a:p>
+            <a:pPr lvl="1"/>
+            <a:r>
+              <a:rPr lang="en-US" sz="2000" dirty="0"/>
+              <a:t>Functions are </a:t>
+            </a:r>
+            <a:r>
+              <a:rPr lang="en-US" sz="2000" i="1" dirty="0"/>
+              <a:t>pure</a:t>
+            </a:r>
+            <a:endParaRPr lang="en-US" sz="2000" dirty="0"/>
+          </a:p>
+          <a:p>
+            <a:pPr lvl="2"/>
+            <a:r>
+              <a:rPr lang="en-US" sz="1800" dirty="0"/>
+              <a:t>Output depends only on input (consistent), i.e., </a:t>
+            </a:r>
+            <a:r>
+              <a:rPr lang="en-US" sz="1800" dirty="0" err="1"/>
+              <a:t>runif</a:t>
+            </a:r>
+            <a:r>
+              <a:rPr lang="en-US" sz="1800" dirty="0"/>
+              <a:t>(), </a:t>
+            </a:r>
+            <a:r>
+              <a:rPr lang="en-US" sz="1800" dirty="0" err="1"/>
+              <a:t>read_csv</a:t>
+            </a:r>
+            <a:r>
+              <a:rPr lang="en-US" sz="1800" dirty="0"/>
+              <a:t>(), </a:t>
+            </a:r>
+            <a:r>
+              <a:rPr lang="en-US" sz="1800" dirty="0" err="1"/>
+              <a:t>Sys.time</a:t>
+            </a:r>
+            <a:r>
+              <a:rPr lang="en-US" sz="1800" dirty="0"/>
+              <a:t>() are not pure</a:t>
+            </a:r>
+          </a:p>
+          <a:p>
+            <a:pPr lvl="2"/>
+            <a:r>
+              <a:rPr lang="en-US" sz="1800" dirty="0"/>
+              <a:t>No side-effects (e.g., not changing global variables or writing to a file)</a:t>
+            </a:r>
+          </a:p>
+          <a:p>
+            <a:pPr lvl="2"/>
+            <a:r>
+              <a:rPr lang="en-US" sz="1800" dirty="0"/>
+              <a:t>Hence, R is not entirely “</a:t>
+            </a:r>
+            <a:r>
+              <a:rPr lang="en-US" sz="1800" i="1" dirty="0"/>
+              <a:t>functional</a:t>
+            </a:r>
+            <a:r>
+              <a:rPr lang="en-US" sz="1800" dirty="0"/>
+              <a:t>” but adopts some elements</a:t>
+            </a:r>
+          </a:p>
+          <a:p>
+            <a:pPr lvl="1"/>
+            <a:endParaRPr lang="en-IL" sz="2000" dirty="0"/>
+          </a:p>
+        </p:txBody>
+      </p:sp>
+      <p:sp>
+        <p:nvSpPr>
+          <p:cNvPr id="4" name="Footer Placeholder 3">
+            <a:extLst>
+              <a:ext uri="{FF2B5EF4-FFF2-40B4-BE49-F238E27FC236}">
+                <a16:creationId xmlns:a16="http://schemas.microsoft.com/office/drawing/2014/main" id="{49478C39-79FE-43DB-B774-2DA03F700A33}"/>
+              </a:ext>
+            </a:extLst>
+          </p:cNvPr>
+          <p:cNvSpPr>
+            <a:spLocks noGrp="1"/>
+          </p:cNvSpPr>
+          <p:nvPr>
+            <p:ph type="ftr" sz="quarter" idx="11"/>
+          </p:nvPr>
+        </p:nvSpPr>
+        <p:spPr/>
+        <p:txBody>
+          <a:bodyPr/>
+          <a:lstStyle/>
+          <a:p>
+            <a:r>
+              <a:rPr lang="en-US"/>
+              <a:t>Materials by Adi Sarid https://adisarid.github.io and http://www.sarid-ins.com</a:t>
+            </a:r>
+            <a:endParaRPr lang="en-US" dirty="0"/>
+          </a:p>
+        </p:txBody>
+      </p:sp>
+      <p:sp>
+        <p:nvSpPr>
+          <p:cNvPr id="5" name="Slide Number Placeholder 4">
+            <a:extLst>
+              <a:ext uri="{FF2B5EF4-FFF2-40B4-BE49-F238E27FC236}">
+                <a16:creationId xmlns:a16="http://schemas.microsoft.com/office/drawing/2014/main" id="{DAB25C23-1D89-4AA2-998E-F7B9F0C35768}"/>
+              </a:ext>
+            </a:extLst>
+          </p:cNvPr>
+          <p:cNvSpPr>
+            <a:spLocks noGrp="1"/>
+          </p:cNvSpPr>
+          <p:nvPr>
+            <p:ph type="sldNum" sz="quarter" idx="12"/>
+          </p:nvPr>
+        </p:nvSpPr>
+        <p:spPr/>
+        <p:txBody>
+          <a:bodyPr/>
+          <a:lstStyle/>
+          <a:p>
+            <a:fld id="{4FAB73BC-B049-4115-A692-8D63A059BFB8}" type="slidenum">
+              <a:rPr lang="en-US" smtClean="0"/>
+              <a:t>2</a:t>
+            </a:fld>
+            <a:endParaRPr lang="en-US" dirty="0"/>
+          </a:p>
+        </p:txBody>
+      </p:sp>
+    </p:spTree>
+    <p:extLst>
+      <p:ext uri="{BB962C8B-B14F-4D97-AF65-F5344CB8AC3E}">
+        <p14:creationId xmlns:p14="http://schemas.microsoft.com/office/powerpoint/2010/main" val="800250464"/>
+      </p:ext>
+    </p:extLst>
+  </p:cSld>
+  <p:clrMapOvr>
+    <a:masterClrMapping/>
+  </p:clrMapOvr>
+</p:sld>
+</file>
+
+<file path=ppt/slides/slide3.xml><?xml version="1.0" encoding="utf-8"?>
+<p:sld xmlns:a="http://schemas.openxmlformats.org/drawingml/2006/main" xmlns:r="http://schemas.openxmlformats.org/officeDocument/2006/relationships" xmlns:p="http://schemas.openxmlformats.org/presentationml/2006/main">
+  <p:cSld>
+    <p:spTree>
+      <p:nvGrpSpPr>
+        <p:cNvPr id="1" name=""/>
+        <p:cNvGrpSpPr/>
+        <p:nvPr/>
+      </p:nvGrpSpPr>
+      <p:grpSpPr>
+        <a:xfrm>
+          <a:off x="0" y="0"/>
+          <a:ext cx="0" cy="0"/>
+          <a:chOff x="0" y="0"/>
+          <a:chExt cx="0" cy="0"/>
+        </a:xfrm>
+      </p:grpSpPr>
+      <p:sp>
+        <p:nvSpPr>
+          <p:cNvPr id="2" name="Title 1">
+            <a:extLst>
+              <a:ext uri="{FF2B5EF4-FFF2-40B4-BE49-F238E27FC236}">
+                <a16:creationId xmlns:a16="http://schemas.microsoft.com/office/drawing/2014/main" id="{89180BCA-BF5C-441D-9DDD-F8A913063388}"/>
+              </a:ext>
+            </a:extLst>
+          </p:cNvPr>
+          <p:cNvSpPr>
+            <a:spLocks noGrp="1"/>
+          </p:cNvSpPr>
+          <p:nvPr>
+            <p:ph type="title"/>
+          </p:nvPr>
+        </p:nvSpPr>
+        <p:spPr/>
+        <p:txBody>
+          <a:bodyPr/>
+          <a:lstStyle/>
+          <a:p>
+            <a:r>
+              <a:rPr lang="en-US" dirty="0"/>
+              <a:t>A functional</a:t>
+            </a:r>
+            <a:endParaRPr lang="en-IL" dirty="0"/>
+          </a:p>
+        </p:txBody>
+      </p:sp>
+      <p:sp>
+        <p:nvSpPr>
+          <p:cNvPr id="3" name="Content Placeholder 2">
+            <a:extLst>
+              <a:ext uri="{FF2B5EF4-FFF2-40B4-BE49-F238E27FC236}">
+                <a16:creationId xmlns:a16="http://schemas.microsoft.com/office/drawing/2014/main" id="{5B037B4C-714F-4C6C-BB15-C878FDAC84D9}"/>
+              </a:ext>
+            </a:extLst>
+          </p:cNvPr>
+          <p:cNvSpPr>
+            <a:spLocks noGrp="1"/>
+          </p:cNvSpPr>
+          <p:nvPr>
+            <p:ph idx="1"/>
+          </p:nvPr>
+        </p:nvSpPr>
+        <p:spPr/>
+        <p:txBody>
+          <a:bodyPr/>
+          <a:lstStyle/>
+          <a:p>
+            <a:r>
+              <a:rPr lang="en-US" dirty="0"/>
+              <a:t>Functional is a function that takes a function as an input and returns a vector as an output (like in math), e.g.:</a:t>
+            </a:r>
+          </a:p>
+          <a:p>
+            <a:pPr marL="0" indent="0">
+              <a:buNone/>
+            </a:pPr>
+            <a:r>
+              <a:rPr lang="en-US" dirty="0">
+                <a:latin typeface="Courier New" panose="02070309020205020404" pitchFamily="49" charset="0"/>
+                <a:cs typeface="Courier New" panose="02070309020205020404" pitchFamily="49" charset="0"/>
+              </a:rPr>
+              <a:t>randomize &lt;- function(f) f(</a:t>
+            </a:r>
+            <a:r>
+              <a:rPr lang="en-US" dirty="0" err="1">
+                <a:latin typeface="Courier New" panose="02070309020205020404" pitchFamily="49" charset="0"/>
+                <a:cs typeface="Courier New" panose="02070309020205020404" pitchFamily="49" charset="0"/>
+              </a:rPr>
+              <a:t>runif</a:t>
+            </a:r>
+            <a:r>
+              <a:rPr lang="en-US" dirty="0">
+                <a:latin typeface="Courier New" panose="02070309020205020404" pitchFamily="49" charset="0"/>
+                <a:cs typeface="Courier New" panose="02070309020205020404" pitchFamily="49" charset="0"/>
+              </a:rPr>
+              <a:t>(1e3))</a:t>
+            </a:r>
+          </a:p>
+          <a:p>
+            <a:pPr marL="0" indent="0">
+              <a:buNone/>
+            </a:pPr>
+            <a:r>
+              <a:rPr lang="en-US" dirty="0">
+                <a:latin typeface="Courier New" panose="02070309020205020404" pitchFamily="49" charset="0"/>
+                <a:cs typeface="Courier New" panose="02070309020205020404" pitchFamily="49" charset="0"/>
+              </a:rPr>
+              <a:t>randomize(mean)</a:t>
+            </a:r>
+          </a:p>
+          <a:p>
+            <a:pPr marL="0" indent="0">
+              <a:buNone/>
+            </a:pPr>
+            <a:r>
+              <a:rPr lang="en-US" dirty="0">
+                <a:latin typeface="Courier New" panose="02070309020205020404" pitchFamily="49" charset="0"/>
+                <a:cs typeface="Courier New" panose="02070309020205020404" pitchFamily="49" charset="0"/>
+              </a:rPr>
+              <a:t>randomize(</a:t>
+            </a:r>
+            <a:r>
+              <a:rPr lang="en-US" dirty="0" err="1">
+                <a:latin typeface="Courier New" panose="02070309020205020404" pitchFamily="49" charset="0"/>
+                <a:cs typeface="Courier New" panose="02070309020205020404" pitchFamily="49" charset="0"/>
+              </a:rPr>
+              <a:t>sd</a:t>
+            </a:r>
+            <a:r>
+              <a:rPr lang="en-US" dirty="0">
+                <a:latin typeface="Courier New" panose="02070309020205020404" pitchFamily="49" charset="0"/>
+                <a:cs typeface="Courier New" panose="02070309020205020404" pitchFamily="49" charset="0"/>
+              </a:rPr>
+              <a:t>)</a:t>
+            </a:r>
+          </a:p>
+          <a:p>
+            <a:pPr marL="0" indent="0">
+              <a:buNone/>
+            </a:pPr>
+            <a:r>
+              <a:rPr lang="en-US" dirty="0">
+                <a:latin typeface="Courier New" panose="02070309020205020404" pitchFamily="49" charset="0"/>
+                <a:cs typeface="Courier New" panose="02070309020205020404" pitchFamily="49" charset="0"/>
+              </a:rPr>
+              <a:t>randomize(plot)</a:t>
+            </a:r>
+          </a:p>
+          <a:p>
+            <a:pPr marL="0" indent="0">
+              <a:buNone/>
+            </a:pPr>
+            <a:r>
+              <a:rPr lang="en-US" dirty="0">
+                <a:latin typeface="Courier New" panose="02070309020205020404" pitchFamily="49" charset="0"/>
+                <a:cs typeface="Courier New" panose="02070309020205020404" pitchFamily="49" charset="0"/>
+              </a:rPr>
+              <a:t>integrate(sin, lower = 0, upper = pi/2)</a:t>
+            </a:r>
+          </a:p>
+          <a:p>
+            <a:pPr marL="0" indent="0">
+              <a:buNone/>
+            </a:pPr>
+            <a:r>
+              <a:rPr lang="en-US" dirty="0">
+                <a:latin typeface="Courier New" panose="02070309020205020404" pitchFamily="49" charset="0"/>
+                <a:cs typeface="Courier New" panose="02070309020205020404" pitchFamily="49" charset="0"/>
+              </a:rPr>
+              <a:t>map, </a:t>
+            </a:r>
+            <a:r>
+              <a:rPr lang="en-US" dirty="0" err="1">
+                <a:latin typeface="Courier New" panose="02070309020205020404" pitchFamily="49" charset="0"/>
+                <a:cs typeface="Courier New" panose="02070309020205020404" pitchFamily="49" charset="0"/>
+              </a:rPr>
+              <a:t>lapply</a:t>
+            </a:r>
+            <a:r>
+              <a:rPr lang="en-US" dirty="0">
+                <a:latin typeface="Courier New" panose="02070309020205020404" pitchFamily="49" charset="0"/>
+                <a:cs typeface="Courier New" panose="02070309020205020404" pitchFamily="49" charset="0"/>
+              </a:rPr>
+              <a:t>, apply,…</a:t>
+            </a:r>
+            <a:endParaRPr lang="en-IL" dirty="0">
+              <a:latin typeface="Courier New" panose="02070309020205020404" pitchFamily="49" charset="0"/>
+              <a:cs typeface="Courier New" panose="02070309020205020404" pitchFamily="49" charset="0"/>
+            </a:endParaRPr>
+          </a:p>
+        </p:txBody>
+      </p:sp>
+      <p:sp>
+        <p:nvSpPr>
+          <p:cNvPr id="4" name="Footer Placeholder 3">
+            <a:extLst>
+              <a:ext uri="{FF2B5EF4-FFF2-40B4-BE49-F238E27FC236}">
+                <a16:creationId xmlns:a16="http://schemas.microsoft.com/office/drawing/2014/main" id="{E5513B86-F51A-4AD7-9D59-4E73D9692F17}"/>
+              </a:ext>
+            </a:extLst>
+          </p:cNvPr>
+          <p:cNvSpPr>
+            <a:spLocks noGrp="1"/>
+          </p:cNvSpPr>
+          <p:nvPr>
+            <p:ph type="ftr" sz="quarter" idx="11"/>
+          </p:nvPr>
+        </p:nvSpPr>
+        <p:spPr/>
+        <p:txBody>
+          <a:bodyPr/>
+          <a:lstStyle/>
+          <a:p>
+            <a:r>
+              <a:rPr lang="en-US"/>
+              <a:t>Materials by Adi Sarid https://adisarid.github.io and http://www.sarid-ins.com</a:t>
+            </a:r>
+            <a:endParaRPr lang="en-US" dirty="0"/>
+          </a:p>
+        </p:txBody>
+      </p:sp>
+      <p:sp>
+        <p:nvSpPr>
+          <p:cNvPr id="5" name="Slide Number Placeholder 4">
+            <a:extLst>
+              <a:ext uri="{FF2B5EF4-FFF2-40B4-BE49-F238E27FC236}">
+                <a16:creationId xmlns:a16="http://schemas.microsoft.com/office/drawing/2014/main" id="{E225B4B7-FDBE-4C4C-BC33-E27BAA8072FB}"/>
+              </a:ext>
+            </a:extLst>
+          </p:cNvPr>
+          <p:cNvSpPr>
+            <a:spLocks noGrp="1"/>
+          </p:cNvSpPr>
+          <p:nvPr>
+            <p:ph type="sldNum" sz="quarter" idx="12"/>
+          </p:nvPr>
+        </p:nvSpPr>
+        <p:spPr/>
+        <p:txBody>
+          <a:bodyPr/>
+          <a:lstStyle/>
+          <a:p>
+            <a:fld id="{4FAB73BC-B049-4115-A692-8D63A059BFB8}" type="slidenum">
+              <a:rPr lang="en-US" smtClean="0"/>
+              <a:t>3</a:t>
+            </a:fld>
+            <a:endParaRPr lang="en-US" dirty="0"/>
+          </a:p>
+        </p:txBody>
+      </p:sp>
+    </p:spTree>
+    <p:extLst>
+      <p:ext uri="{BB962C8B-B14F-4D97-AF65-F5344CB8AC3E}">
+        <p14:creationId xmlns:p14="http://schemas.microsoft.com/office/powerpoint/2010/main" val="202388887"/>
+      </p:ext>
+    </p:extLst>
+  </p:cSld>
+  <p:clrMapOvr>
+    <a:masterClrMapping/>
+  </p:clrMapOvr>
+</p:sld>
+</file>
+
+<file path=ppt/slides/slide4.xml><?xml version="1.0" encoding="utf-8"?>
+<p:sld xmlns:a="http://schemas.openxmlformats.org/drawingml/2006/main" xmlns:r="http://schemas.openxmlformats.org/officeDocument/2006/relationships" xmlns:p="http://schemas.openxmlformats.org/presentationml/2006/main">
+  <p:cSld>
+    <p:spTree>
+      <p:nvGrpSpPr>
+        <p:cNvPr id="1" name=""/>
+        <p:cNvGrpSpPr/>
+        <p:nvPr/>
+      </p:nvGrpSpPr>
+      <p:grpSpPr>
+        <a:xfrm>
+          <a:off x="0" y="0"/>
+          <a:ext cx="0" cy="0"/>
+          <a:chOff x="0" y="0"/>
+          <a:chExt cx="0" cy="0"/>
+        </a:xfrm>
+      </p:grpSpPr>
+      <p:sp>
+        <p:nvSpPr>
+          <p:cNvPr id="2" name="Title 1">
+            <a:extLst>
+              <a:ext uri="{FF2B5EF4-FFF2-40B4-BE49-F238E27FC236}">
+                <a16:creationId xmlns:a16="http://schemas.microsoft.com/office/drawing/2014/main" id="{4E845991-19E7-46CE-A706-A6AB32FB95DB}"/>
+              </a:ext>
+            </a:extLst>
+          </p:cNvPr>
+          <p:cNvSpPr>
+            <a:spLocks noGrp="1"/>
+          </p:cNvSpPr>
+          <p:nvPr>
+            <p:ph type="title"/>
+          </p:nvPr>
+        </p:nvSpPr>
+        <p:spPr/>
+        <p:txBody>
+          <a:bodyPr/>
+          <a:lstStyle/>
+          <a:p>
+            <a:r>
+              <a:rPr lang="en-US" dirty="0"/>
+              <a:t>Be specific</a:t>
+            </a:r>
+            <a:endParaRPr lang="en-IL" dirty="0"/>
+          </a:p>
+        </p:txBody>
+      </p:sp>
+      <p:sp>
+        <p:nvSpPr>
+          <p:cNvPr id="3" name="Content Placeholder 2">
+            <a:extLst>
+              <a:ext uri="{FF2B5EF4-FFF2-40B4-BE49-F238E27FC236}">
+                <a16:creationId xmlns:a16="http://schemas.microsoft.com/office/drawing/2014/main" id="{7F742DAE-0B4B-4BD3-88E6-476E488ED7F5}"/>
+              </a:ext>
+            </a:extLst>
+          </p:cNvPr>
+          <p:cNvSpPr>
+            <a:spLocks noGrp="1"/>
+          </p:cNvSpPr>
+          <p:nvPr>
+            <p:ph idx="1"/>
+          </p:nvPr>
+        </p:nvSpPr>
+        <p:spPr/>
+        <p:txBody>
+          <a:bodyPr/>
+          <a:lstStyle/>
+          <a:p>
+            <a:r>
+              <a:rPr lang="en-US" dirty="0"/>
+              <a:t>As a “best practice”, when you are using iterations, you should be as specific as possible, and pre-allocate as much as possible.</a:t>
+            </a:r>
+          </a:p>
+          <a:p>
+            <a:r>
+              <a:rPr lang="en-US" dirty="0"/>
+              <a:t>In other words your preference should be:</a:t>
+            </a:r>
+          </a:p>
+          <a:p>
+            <a:pPr lvl="1"/>
+            <a:r>
+              <a:rPr lang="en-US" dirty="0" err="1"/>
+              <a:t>purrr</a:t>
+            </a:r>
+            <a:r>
+              <a:rPr lang="en-US" dirty="0"/>
+              <a:t> &gt; for &gt; while &gt; repeat</a:t>
+            </a:r>
+          </a:p>
+          <a:p>
+            <a:endParaRPr lang="en-IL" dirty="0"/>
+          </a:p>
+        </p:txBody>
+      </p:sp>
+      <p:sp>
+        <p:nvSpPr>
+          <p:cNvPr id="4" name="Footer Placeholder 3">
+            <a:extLst>
+              <a:ext uri="{FF2B5EF4-FFF2-40B4-BE49-F238E27FC236}">
+                <a16:creationId xmlns:a16="http://schemas.microsoft.com/office/drawing/2014/main" id="{86DFC2BD-5534-4B78-A616-48FE5D57B7E7}"/>
+              </a:ext>
+            </a:extLst>
+          </p:cNvPr>
+          <p:cNvSpPr>
+            <a:spLocks noGrp="1"/>
+          </p:cNvSpPr>
+          <p:nvPr>
+            <p:ph type="ftr" sz="quarter" idx="11"/>
+          </p:nvPr>
+        </p:nvSpPr>
+        <p:spPr/>
+        <p:txBody>
+          <a:bodyPr/>
+          <a:lstStyle/>
+          <a:p>
+            <a:r>
+              <a:rPr lang="en-US"/>
+              <a:t>Materials by Adi Sarid https://adisarid.github.io and http://www.sarid-ins.com</a:t>
+            </a:r>
+            <a:endParaRPr lang="en-US" dirty="0"/>
+          </a:p>
+        </p:txBody>
+      </p:sp>
+      <p:sp>
+        <p:nvSpPr>
+          <p:cNvPr id="5" name="Slide Number Placeholder 4">
+            <a:extLst>
+              <a:ext uri="{FF2B5EF4-FFF2-40B4-BE49-F238E27FC236}">
+                <a16:creationId xmlns:a16="http://schemas.microsoft.com/office/drawing/2014/main" id="{04CE614E-9172-45D0-B7BA-66D99F548630}"/>
+              </a:ext>
+            </a:extLst>
+          </p:cNvPr>
+          <p:cNvSpPr>
+            <a:spLocks noGrp="1"/>
+          </p:cNvSpPr>
+          <p:nvPr>
+            <p:ph type="sldNum" sz="quarter" idx="12"/>
+          </p:nvPr>
+        </p:nvSpPr>
+        <p:spPr/>
+        <p:txBody>
+          <a:bodyPr/>
+          <a:lstStyle/>
+          <a:p>
+            <a:fld id="{4FAB73BC-B049-4115-A692-8D63A059BFB8}" type="slidenum">
+              <a:rPr lang="en-US" smtClean="0"/>
+              <a:t>4</a:t>
+            </a:fld>
+            <a:endParaRPr lang="en-US" dirty="0"/>
+          </a:p>
+        </p:txBody>
+      </p:sp>
+    </p:spTree>
+    <p:extLst>
+      <p:ext uri="{BB962C8B-B14F-4D97-AF65-F5344CB8AC3E}">
+        <p14:creationId xmlns:p14="http://schemas.microsoft.com/office/powerpoint/2010/main" val="1285495968"/>
+      </p:ext>
+    </p:extLst>
+  </p:cSld>
+  <p:clrMapOvr>
+    <a:masterClrMapping/>
+  </p:clrMapOvr>
+</p:sld>
+</file>
+
+<file path=ppt/slides/slide5.xml><?xml version="1.0" encoding="utf-8"?>
+<p:sld xmlns:a="http://schemas.openxmlformats.org/drawingml/2006/main" xmlns:r="http://schemas.openxmlformats.org/officeDocument/2006/relationships" xmlns:p="http://schemas.openxmlformats.org/presentationml/2006/main">
+  <p:cSld>
+    <p:spTree>
+      <p:nvGrpSpPr>
+        <p:cNvPr id="1" name=""/>
+        <p:cNvGrpSpPr/>
+        <p:nvPr/>
+      </p:nvGrpSpPr>
+      <p:grpSpPr>
+        <a:xfrm>
+          <a:off x="0" y="0"/>
+          <a:ext cx="0" cy="0"/>
+          <a:chOff x="0" y="0"/>
+          <a:chExt cx="0" cy="0"/>
+        </a:xfrm>
+      </p:grpSpPr>
+      <p:sp>
+        <p:nvSpPr>
+          <p:cNvPr id="2" name="Title 1">
+            <a:extLst>
+              <a:ext uri="{FF2B5EF4-FFF2-40B4-BE49-F238E27FC236}">
+                <a16:creationId xmlns:a16="http://schemas.microsoft.com/office/drawing/2014/main" id="{DE376234-FF2E-49D6-B9EB-716F60664C94}"/>
+              </a:ext>
+            </a:extLst>
+          </p:cNvPr>
+          <p:cNvSpPr>
+            <a:spLocks noGrp="1"/>
+          </p:cNvSpPr>
+          <p:nvPr>
+            <p:ph type="title"/>
+          </p:nvPr>
+        </p:nvSpPr>
+        <p:spPr/>
+        <p:txBody>
+          <a:bodyPr/>
+          <a:lstStyle/>
+          <a:p>
+            <a:r>
+              <a:rPr lang="en-US" dirty="0" err="1"/>
+              <a:t>purrr</a:t>
+            </a:r>
+            <a:r>
+              <a:rPr lang="en-US" dirty="0"/>
+              <a:t>::map</a:t>
+            </a:r>
+            <a:endParaRPr lang="en-IL" dirty="0"/>
+          </a:p>
+        </p:txBody>
+      </p:sp>
+      <p:sp>
+        <p:nvSpPr>
+          <p:cNvPr id="3" name="Content Placeholder 2">
+            <a:extLst>
+              <a:ext uri="{FF2B5EF4-FFF2-40B4-BE49-F238E27FC236}">
+                <a16:creationId xmlns:a16="http://schemas.microsoft.com/office/drawing/2014/main" id="{D550A6E6-1042-415F-AD8A-943DFD49D2EB}"/>
+              </a:ext>
+            </a:extLst>
+          </p:cNvPr>
+          <p:cNvSpPr>
+            <a:spLocks noGrp="1"/>
+          </p:cNvSpPr>
+          <p:nvPr>
+            <p:ph idx="1"/>
+          </p:nvPr>
+        </p:nvSpPr>
+        <p:spPr/>
+        <p:txBody>
+          <a:bodyPr/>
+          <a:lstStyle/>
+          <a:p>
+            <a:r>
+              <a:rPr lang="en-US" dirty="0"/>
+              <a:t>Takes a vector and a function and does this:</a:t>
+            </a:r>
+          </a:p>
+          <a:p>
+            <a:r>
+              <a:rPr lang="en-US" dirty="0"/>
+              <a:t>The </a:t>
+            </a:r>
+            <a:r>
+              <a:rPr lang="en-US" b="1" dirty="0"/>
+              <a:t>implementation is in C code</a:t>
+            </a:r>
+            <a:r>
+              <a:rPr lang="en-US" dirty="0"/>
+              <a:t>, </a:t>
+            </a:r>
+          </a:p>
+          <a:p>
+            <a:r>
+              <a:rPr lang="en-US" dirty="0"/>
+              <a:t>but is equivalent logically to something like:</a:t>
+            </a:r>
+          </a:p>
+          <a:p>
+            <a:pPr marL="0" indent="0">
+              <a:buNone/>
+            </a:pPr>
+            <a:r>
+              <a:rPr lang="en-US" sz="1200" dirty="0" err="1">
+                <a:latin typeface="Courier New" panose="02070309020205020404" pitchFamily="49" charset="0"/>
+                <a:cs typeface="Courier New" panose="02070309020205020404" pitchFamily="49" charset="0"/>
+              </a:rPr>
+              <a:t>simple_map</a:t>
+            </a:r>
+            <a:r>
+              <a:rPr lang="en-US" sz="1200" dirty="0">
+                <a:latin typeface="Courier New" panose="02070309020205020404" pitchFamily="49" charset="0"/>
+                <a:cs typeface="Courier New" panose="02070309020205020404" pitchFamily="49" charset="0"/>
+              </a:rPr>
+              <a:t> &lt;- function(x, f, ...) {</a:t>
+            </a:r>
+            <a:br>
+              <a:rPr lang="en-US" sz="1200" dirty="0">
+                <a:latin typeface="Courier New" panose="02070309020205020404" pitchFamily="49" charset="0"/>
+                <a:cs typeface="Courier New" panose="02070309020205020404" pitchFamily="49" charset="0"/>
+              </a:rPr>
+            </a:br>
+            <a:r>
+              <a:rPr lang="en-US" sz="1200" dirty="0">
+                <a:latin typeface="Courier New" panose="02070309020205020404" pitchFamily="49" charset="0"/>
+                <a:cs typeface="Courier New" panose="02070309020205020404" pitchFamily="49" charset="0"/>
+              </a:rPr>
+              <a:t>   out &lt;- vector("list", length(x))</a:t>
+            </a:r>
+            <a:br>
+              <a:rPr lang="en-US" sz="1200" dirty="0">
+                <a:latin typeface="Courier New" panose="02070309020205020404" pitchFamily="49" charset="0"/>
+                <a:cs typeface="Courier New" panose="02070309020205020404" pitchFamily="49" charset="0"/>
+              </a:rPr>
+            </a:br>
+            <a:r>
+              <a:rPr lang="en-US" sz="1200" dirty="0">
+                <a:latin typeface="Courier New" panose="02070309020205020404" pitchFamily="49" charset="0"/>
+                <a:cs typeface="Courier New" panose="02070309020205020404" pitchFamily="49" charset="0"/>
+              </a:rPr>
+              <a:t>   for (</a:t>
+            </a:r>
+            <a:r>
+              <a:rPr lang="en-US" sz="1200" dirty="0" err="1">
+                <a:latin typeface="Courier New" panose="02070309020205020404" pitchFamily="49" charset="0"/>
+                <a:cs typeface="Courier New" panose="02070309020205020404" pitchFamily="49" charset="0"/>
+              </a:rPr>
+              <a:t>i</a:t>
+            </a:r>
+            <a:r>
+              <a:rPr lang="en-US" sz="1200" dirty="0">
+                <a:latin typeface="Courier New" panose="02070309020205020404" pitchFamily="49" charset="0"/>
+                <a:cs typeface="Courier New" panose="02070309020205020404" pitchFamily="49" charset="0"/>
+              </a:rPr>
+              <a:t> in </a:t>
+            </a:r>
+            <a:r>
+              <a:rPr lang="en-US" sz="1200" dirty="0" err="1">
+                <a:latin typeface="Courier New" panose="02070309020205020404" pitchFamily="49" charset="0"/>
+                <a:cs typeface="Courier New" panose="02070309020205020404" pitchFamily="49" charset="0"/>
+              </a:rPr>
+              <a:t>seq_along</a:t>
+            </a:r>
+            <a:r>
+              <a:rPr lang="en-US" sz="1200" dirty="0">
+                <a:latin typeface="Courier New" panose="02070309020205020404" pitchFamily="49" charset="0"/>
+                <a:cs typeface="Courier New" panose="02070309020205020404" pitchFamily="49" charset="0"/>
+              </a:rPr>
+              <a:t>(x)) {</a:t>
+            </a:r>
+            <a:br>
+              <a:rPr lang="en-US" sz="1200" dirty="0">
+                <a:latin typeface="Courier New" panose="02070309020205020404" pitchFamily="49" charset="0"/>
+                <a:cs typeface="Courier New" panose="02070309020205020404" pitchFamily="49" charset="0"/>
+              </a:rPr>
+            </a:br>
+            <a:r>
+              <a:rPr lang="en-US" sz="1200" dirty="0">
+                <a:latin typeface="Courier New" panose="02070309020205020404" pitchFamily="49" charset="0"/>
+                <a:cs typeface="Courier New" panose="02070309020205020404" pitchFamily="49" charset="0"/>
+              </a:rPr>
+              <a:t>      out[[</a:t>
+            </a:r>
+            <a:r>
+              <a:rPr lang="en-US" sz="1200" dirty="0" err="1">
+                <a:latin typeface="Courier New" panose="02070309020205020404" pitchFamily="49" charset="0"/>
+                <a:cs typeface="Courier New" panose="02070309020205020404" pitchFamily="49" charset="0"/>
+              </a:rPr>
+              <a:t>i</a:t>
+            </a:r>
+            <a:r>
+              <a:rPr lang="en-US" sz="1200" dirty="0">
+                <a:latin typeface="Courier New" panose="02070309020205020404" pitchFamily="49" charset="0"/>
+                <a:cs typeface="Courier New" panose="02070309020205020404" pitchFamily="49" charset="0"/>
+              </a:rPr>
+              <a:t>]] &lt;- f(x[[</a:t>
+            </a:r>
+            <a:r>
+              <a:rPr lang="en-US" sz="1200" dirty="0" err="1">
+                <a:latin typeface="Courier New" panose="02070309020205020404" pitchFamily="49" charset="0"/>
+                <a:cs typeface="Courier New" panose="02070309020205020404" pitchFamily="49" charset="0"/>
+              </a:rPr>
+              <a:t>i</a:t>
+            </a:r>
+            <a:r>
+              <a:rPr lang="en-US" sz="1200" dirty="0">
+                <a:latin typeface="Courier New" panose="02070309020205020404" pitchFamily="49" charset="0"/>
+                <a:cs typeface="Courier New" panose="02070309020205020404" pitchFamily="49" charset="0"/>
+              </a:rPr>
+              <a:t>]], ...)</a:t>
+            </a:r>
+            <a:br>
+              <a:rPr lang="en-US" sz="1200" dirty="0">
+                <a:latin typeface="Courier New" panose="02070309020205020404" pitchFamily="49" charset="0"/>
+                <a:cs typeface="Courier New" panose="02070309020205020404" pitchFamily="49" charset="0"/>
+              </a:rPr>
+            </a:br>
+            <a:r>
+              <a:rPr lang="en-US" sz="1200" dirty="0">
+                <a:latin typeface="Courier New" panose="02070309020205020404" pitchFamily="49" charset="0"/>
+                <a:cs typeface="Courier New" panose="02070309020205020404" pitchFamily="49" charset="0"/>
+              </a:rPr>
+              <a:t>   }</a:t>
+            </a:r>
+            <a:br>
+              <a:rPr lang="en-US" sz="1200" dirty="0">
+                <a:latin typeface="Courier New" panose="02070309020205020404" pitchFamily="49" charset="0"/>
+                <a:cs typeface="Courier New" panose="02070309020205020404" pitchFamily="49" charset="0"/>
+              </a:rPr>
+            </a:br>
+            <a:r>
+              <a:rPr lang="en-US" sz="1200" dirty="0">
+                <a:latin typeface="Courier New" panose="02070309020205020404" pitchFamily="49" charset="0"/>
+                <a:cs typeface="Courier New" panose="02070309020205020404" pitchFamily="49" charset="0"/>
+              </a:rPr>
+              <a:t>   out</a:t>
+            </a:r>
+            <a:br>
+              <a:rPr lang="en-US" sz="1200" dirty="0">
+                <a:latin typeface="Courier New" panose="02070309020205020404" pitchFamily="49" charset="0"/>
+                <a:cs typeface="Courier New" panose="02070309020205020404" pitchFamily="49" charset="0"/>
+              </a:rPr>
+            </a:br>
+            <a:r>
+              <a:rPr lang="en-US" sz="1200" dirty="0">
+                <a:latin typeface="Courier New" panose="02070309020205020404" pitchFamily="49" charset="0"/>
+                <a:cs typeface="Courier New" panose="02070309020205020404" pitchFamily="49" charset="0"/>
+              </a:rPr>
+              <a:t>}</a:t>
+            </a:r>
+          </a:p>
+          <a:p>
+            <a:pPr marL="0" indent="0">
+              <a:buNone/>
+            </a:pPr>
+            <a:endParaRPr lang="en-IL" sz="1200" dirty="0">
+              <a:latin typeface="Courier New" panose="02070309020205020404" pitchFamily="49" charset="0"/>
+              <a:cs typeface="Courier New" panose="02070309020205020404" pitchFamily="49" charset="0"/>
+            </a:endParaRPr>
+          </a:p>
+          <a:p>
+            <a:r>
+              <a:rPr lang="en-US" dirty="0"/>
+              <a:t>map() returns a list, </a:t>
+            </a:r>
+            <a:r>
+              <a:rPr lang="en-US" dirty="0" err="1"/>
+              <a:t>map_dbl</a:t>
+            </a:r>
+            <a:r>
+              <a:rPr lang="en-US" dirty="0"/>
+              <a:t>(), </a:t>
+            </a:r>
+            <a:r>
+              <a:rPr lang="en-US" dirty="0" err="1"/>
+              <a:t>map_lgl</a:t>
+            </a:r>
+            <a:r>
+              <a:rPr lang="en-US" dirty="0"/>
+              <a:t>(), </a:t>
+            </a:r>
+            <a:r>
+              <a:rPr lang="en-US" dirty="0" err="1"/>
+              <a:t>map_int</a:t>
+            </a:r>
+            <a:r>
+              <a:rPr lang="en-US" dirty="0"/>
+              <a:t>(), </a:t>
+            </a:r>
+            <a:r>
+              <a:rPr lang="en-US" dirty="0" err="1"/>
+              <a:t>map_chr</a:t>
+            </a:r>
+            <a:r>
+              <a:rPr lang="en-US" dirty="0"/>
+              <a:t>() return a </a:t>
+            </a:r>
+            <a:r>
+              <a:rPr lang="en-US" dirty="0" err="1"/>
+              <a:t>vecor</a:t>
+            </a:r>
+            <a:r>
+              <a:rPr lang="en-US" dirty="0"/>
+              <a:t> of type double, logical, integer, and character.</a:t>
+            </a:r>
+          </a:p>
+        </p:txBody>
+      </p:sp>
+      <p:sp>
+        <p:nvSpPr>
+          <p:cNvPr id="4" name="Footer Placeholder 3">
+            <a:extLst>
+              <a:ext uri="{FF2B5EF4-FFF2-40B4-BE49-F238E27FC236}">
+                <a16:creationId xmlns:a16="http://schemas.microsoft.com/office/drawing/2014/main" id="{47CCA91D-765B-4BD0-80FE-07F0351E5727}"/>
+              </a:ext>
+            </a:extLst>
+          </p:cNvPr>
+          <p:cNvSpPr>
+            <a:spLocks noGrp="1"/>
+          </p:cNvSpPr>
+          <p:nvPr>
+            <p:ph type="ftr" sz="quarter" idx="11"/>
+          </p:nvPr>
+        </p:nvSpPr>
+        <p:spPr/>
+        <p:txBody>
+          <a:bodyPr/>
+          <a:lstStyle/>
+          <a:p>
+            <a:r>
+              <a:rPr lang="en-US"/>
+              <a:t>Materials by Adi Sarid https://adisarid.github.io and http://www.sarid-ins.com</a:t>
+            </a:r>
+            <a:endParaRPr lang="en-US" dirty="0"/>
+          </a:p>
+        </p:txBody>
+      </p:sp>
+      <p:sp>
+        <p:nvSpPr>
+          <p:cNvPr id="5" name="Slide Number Placeholder 4">
+            <a:extLst>
+              <a:ext uri="{FF2B5EF4-FFF2-40B4-BE49-F238E27FC236}">
+                <a16:creationId xmlns:a16="http://schemas.microsoft.com/office/drawing/2014/main" id="{EFDC0F16-25B5-4F02-B3FA-CA058A17C590}"/>
+              </a:ext>
+            </a:extLst>
+          </p:cNvPr>
+          <p:cNvSpPr>
+            <a:spLocks noGrp="1"/>
+          </p:cNvSpPr>
+          <p:nvPr>
+            <p:ph type="sldNum" sz="quarter" idx="12"/>
+          </p:nvPr>
+        </p:nvSpPr>
+        <p:spPr/>
+        <p:txBody>
+          <a:bodyPr/>
+          <a:lstStyle/>
+          <a:p>
+            <a:fld id="{4FAB73BC-B049-4115-A692-8D63A059BFB8}" type="slidenum">
+              <a:rPr lang="en-US" smtClean="0"/>
+              <a:t>5</a:t>
+            </a:fld>
+            <a:endParaRPr lang="en-US" dirty="0"/>
+          </a:p>
+        </p:txBody>
+      </p:sp>
+      <p:pic>
+        <p:nvPicPr>
+          <p:cNvPr id="6" name="Picture 5">
+            <a:extLst>
+              <a:ext uri="{FF2B5EF4-FFF2-40B4-BE49-F238E27FC236}">
+                <a16:creationId xmlns:a16="http://schemas.microsoft.com/office/drawing/2014/main" id="{A3C058F5-DE12-4D5A-88E5-26297C2459A7}"/>
+              </a:ext>
+            </a:extLst>
+          </p:cNvPr>
+          <p:cNvPicPr>
+            <a:picLocks noChangeAspect="1"/>
+          </p:cNvPicPr>
+          <p:nvPr/>
+        </p:nvPicPr>
+        <p:blipFill>
+          <a:blip r:embed="rId2"/>
+          <a:stretch>
+            <a:fillRect/>
+          </a:stretch>
+        </p:blipFill>
+        <p:spPr>
+          <a:xfrm>
+            <a:off x="7976501" y="1423358"/>
+            <a:ext cx="2475699" cy="1892060"/>
+          </a:xfrm>
+          <a:prstGeom prst="rect">
+            <a:avLst/>
+          </a:prstGeom>
+        </p:spPr>
+      </p:pic>
+    </p:spTree>
+    <p:extLst>
+      <p:ext uri="{BB962C8B-B14F-4D97-AF65-F5344CB8AC3E}">
+        <p14:creationId xmlns:p14="http://schemas.microsoft.com/office/powerpoint/2010/main" val="4231588211"/>
+      </p:ext>
+    </p:extLst>
+  </p:cSld>
+  <p:clrMapOvr>
+    <a:masterClrMapping/>
+  </p:clrMapOvr>
+</p:sld>
+</file>
+
+<file path=ppt/slides/slide6.xml><?xml version="1.0" encoding="utf-8"?>
+<p:sld xmlns:a="http://schemas.openxmlformats.org/drawingml/2006/main" xmlns:r="http://schemas.openxmlformats.org/officeDocument/2006/relationships" xmlns:p="http://schemas.openxmlformats.org/presentationml/2006/main">
+  <p:cSld>
+    <p:spTree>
+      <p:nvGrpSpPr>
+        <p:cNvPr id="1" name=""/>
+        <p:cNvGrpSpPr/>
+        <p:nvPr/>
+      </p:nvGrpSpPr>
+      <p:grpSpPr>
+        <a:xfrm>
+          <a:off x="0" y="0"/>
+          <a:ext cx="0" cy="0"/>
+          <a:chOff x="0" y="0"/>
+          <a:chExt cx="0" cy="0"/>
+        </a:xfrm>
+      </p:grpSpPr>
+      <p:sp>
+        <p:nvSpPr>
+          <p:cNvPr id="2" name="Title 1">
+            <a:extLst>
+              <a:ext uri="{FF2B5EF4-FFF2-40B4-BE49-F238E27FC236}">
                 <a16:creationId xmlns:a16="http://schemas.microsoft.com/office/drawing/2014/main" id="{D2AC8D4D-D8EB-4870-8716-D75DC1D78066}"/>
               </a:ext>
             </a:extLst>
@@ -7005,7 +8126,7 @@
           <a:p>
             <a:fld id="{4FAB73BC-B049-4115-A692-8D63A059BFB8}" type="slidenum">
               <a:rPr lang="en-US" smtClean="0"/>
-              <a:t>2</a:t>
+              <a:t>6</a:t>
             </a:fld>
             <a:endParaRPr lang="en-US" dirty="0"/>
           </a:p>
@@ -8145,1127 +9266,6 @@
       <p:bldP spid="20" grpId="0" animBg="1"/>
     </p:bldLst>
   </p:timing>
-</p:sld>
-</file>
-
-<file path=ppt/slides/slide3.xml><?xml version="1.0" encoding="utf-8"?>
-<p:sld xmlns:a="http://schemas.openxmlformats.org/drawingml/2006/main" xmlns:r="http://schemas.openxmlformats.org/officeDocument/2006/relationships" xmlns:p="http://schemas.openxmlformats.org/presentationml/2006/main">
-  <p:cSld>
-    <p:spTree>
-      <p:nvGrpSpPr>
-        <p:cNvPr id="1" name=""/>
-        <p:cNvGrpSpPr/>
-        <p:nvPr/>
-      </p:nvGrpSpPr>
-      <p:grpSpPr>
-        <a:xfrm>
-          <a:off x="0" y="0"/>
-          <a:ext cx="0" cy="0"/>
-          <a:chOff x="0" y="0"/>
-          <a:chExt cx="0" cy="0"/>
-        </a:xfrm>
-      </p:grpSpPr>
-      <p:sp>
-        <p:nvSpPr>
-          <p:cNvPr id="2" name="Title 1">
-            <a:extLst>
-              <a:ext uri="{FF2B5EF4-FFF2-40B4-BE49-F238E27FC236}">
-                <a16:creationId xmlns:a16="http://schemas.microsoft.com/office/drawing/2014/main" id="{A2992973-ABCE-4744-94FF-8CEE1D8BFF8F}"/>
-              </a:ext>
-            </a:extLst>
-          </p:cNvPr>
-          <p:cNvSpPr>
-            <a:spLocks noGrp="1"/>
-          </p:cNvSpPr>
-          <p:nvPr>
-            <p:ph type="title"/>
-          </p:nvPr>
-        </p:nvSpPr>
-        <p:spPr/>
-        <p:txBody>
-          <a:bodyPr/>
-          <a:lstStyle/>
-          <a:p>
-            <a:r>
-              <a:rPr lang="en-US" dirty="0"/>
-              <a:t>Why </a:t>
-            </a:r>
-            <a:r>
-              <a:rPr lang="en-US" dirty="0" err="1"/>
-              <a:t>purrr</a:t>
-            </a:r>
-            <a:r>
-              <a:rPr lang="en-US" dirty="0"/>
-              <a:t>? </a:t>
-            </a:r>
-            <a:br>
-              <a:rPr lang="en-US" dirty="0"/>
-            </a:br>
-            <a:r>
-              <a:rPr lang="en-US" dirty="0"/>
-              <a:t>What is functional programming?</a:t>
-            </a:r>
-            <a:endParaRPr lang="en-IL" dirty="0"/>
-          </a:p>
-        </p:txBody>
-      </p:sp>
-      <p:sp>
-        <p:nvSpPr>
-          <p:cNvPr id="3" name="Content Placeholder 2">
-            <a:extLst>
-              <a:ext uri="{FF2B5EF4-FFF2-40B4-BE49-F238E27FC236}">
-                <a16:creationId xmlns:a16="http://schemas.microsoft.com/office/drawing/2014/main" id="{3D32442E-0F4D-4FDE-8312-B884AB1A08A6}"/>
-              </a:ext>
-            </a:extLst>
-          </p:cNvPr>
-          <p:cNvSpPr>
-            <a:spLocks noGrp="1"/>
-          </p:cNvSpPr>
-          <p:nvPr>
-            <p:ph idx="1"/>
-          </p:nvPr>
-        </p:nvSpPr>
-        <p:spPr/>
-        <p:txBody>
-          <a:bodyPr>
-            <a:normAutofit lnSpcReduction="10000"/>
-          </a:bodyPr>
-          <a:lstStyle/>
-          <a:p>
-            <a:r>
-              <a:rPr lang="en-US" sz="2400" dirty="0"/>
-              <a:t>“</a:t>
-            </a:r>
-            <a:r>
-              <a:rPr lang="en-US" sz="2400" i="1" dirty="0" err="1"/>
-              <a:t>purrr</a:t>
-            </a:r>
-            <a:r>
-              <a:rPr lang="en-US" sz="2400" i="1" dirty="0"/>
-              <a:t> enhances R’s functional programming (FP) toolkit by providing a complete and consistent set of tools for working with functions and vectors</a:t>
-            </a:r>
-            <a:r>
-              <a:rPr lang="en-US" sz="2400" dirty="0"/>
-              <a:t>”</a:t>
-            </a:r>
-          </a:p>
-          <a:p>
-            <a:pPr lvl="1"/>
-            <a:r>
-              <a:rPr lang="en-US" sz="2000" dirty="0" err="1"/>
-              <a:t>purrr’s</a:t>
-            </a:r>
-            <a:r>
-              <a:rPr lang="en-US" sz="2000" dirty="0"/>
-              <a:t> overview (</a:t>
-            </a:r>
-            <a:r>
-              <a:rPr lang="en-US" sz="2000" dirty="0">
-                <a:hlinkClick r:id="rId2"/>
-              </a:rPr>
-              <a:t>https://purrr.tidyverse.org/</a:t>
-            </a:r>
-            <a:r>
-              <a:rPr lang="en-US" sz="2000" dirty="0"/>
-              <a:t>)</a:t>
-            </a:r>
-            <a:endParaRPr lang="en-US" sz="2000" i="1" dirty="0"/>
-          </a:p>
-          <a:p>
-            <a:r>
-              <a:rPr lang="en-US" sz="2200" dirty="0"/>
-              <a:t>What makes a programming language “</a:t>
-            </a:r>
-            <a:r>
-              <a:rPr lang="en-US" sz="2200" i="1" dirty="0"/>
-              <a:t>functional</a:t>
-            </a:r>
-            <a:r>
-              <a:rPr lang="en-US" sz="2200" dirty="0"/>
-              <a:t>”?</a:t>
-            </a:r>
-          </a:p>
-          <a:p>
-            <a:pPr lvl="1"/>
-            <a:r>
-              <a:rPr lang="en-US" sz="2000" dirty="0"/>
-              <a:t>Functions behave like any other data structure (e.g. you can “pass them” as a variable)</a:t>
-            </a:r>
-          </a:p>
-          <a:p>
-            <a:pPr lvl="1"/>
-            <a:r>
-              <a:rPr lang="en-US" sz="2000" dirty="0"/>
-              <a:t>Functions are </a:t>
-            </a:r>
-            <a:r>
-              <a:rPr lang="en-US" sz="2000" i="1" dirty="0"/>
-              <a:t>pure</a:t>
-            </a:r>
-            <a:endParaRPr lang="en-US" sz="2000" dirty="0"/>
-          </a:p>
-          <a:p>
-            <a:pPr lvl="2"/>
-            <a:r>
-              <a:rPr lang="en-US" sz="1800" dirty="0"/>
-              <a:t>Output depends only on input (consistent), i.e., </a:t>
-            </a:r>
-            <a:r>
-              <a:rPr lang="en-US" sz="1800" dirty="0" err="1"/>
-              <a:t>runif</a:t>
-            </a:r>
-            <a:r>
-              <a:rPr lang="en-US" sz="1800" dirty="0"/>
-              <a:t>(), </a:t>
-            </a:r>
-            <a:r>
-              <a:rPr lang="en-US" sz="1800" dirty="0" err="1"/>
-              <a:t>read_csv</a:t>
-            </a:r>
-            <a:r>
-              <a:rPr lang="en-US" sz="1800" dirty="0"/>
-              <a:t>(), </a:t>
-            </a:r>
-            <a:r>
-              <a:rPr lang="en-US" sz="1800" dirty="0" err="1"/>
-              <a:t>Sys.time</a:t>
-            </a:r>
-            <a:r>
-              <a:rPr lang="en-US" sz="1800" dirty="0"/>
-              <a:t>() are not pure</a:t>
-            </a:r>
-          </a:p>
-          <a:p>
-            <a:pPr lvl="2"/>
-            <a:r>
-              <a:rPr lang="en-US" sz="1800" dirty="0"/>
-              <a:t>No side-effects (e.g., not changing global variables or writing to a file)</a:t>
-            </a:r>
-          </a:p>
-          <a:p>
-            <a:pPr lvl="2"/>
-            <a:r>
-              <a:rPr lang="en-US" sz="1800" dirty="0"/>
-              <a:t>Hence, R is not entirely “</a:t>
-            </a:r>
-            <a:r>
-              <a:rPr lang="en-US" sz="1800" i="1" dirty="0"/>
-              <a:t>functional</a:t>
-            </a:r>
-            <a:r>
-              <a:rPr lang="en-US" sz="1800" dirty="0"/>
-              <a:t>” but adopts some elements</a:t>
-            </a:r>
-          </a:p>
-          <a:p>
-            <a:pPr lvl="1"/>
-            <a:endParaRPr lang="en-IL" sz="2000" dirty="0"/>
-          </a:p>
-        </p:txBody>
-      </p:sp>
-      <p:sp>
-        <p:nvSpPr>
-          <p:cNvPr id="4" name="Footer Placeholder 3">
-            <a:extLst>
-              <a:ext uri="{FF2B5EF4-FFF2-40B4-BE49-F238E27FC236}">
-                <a16:creationId xmlns:a16="http://schemas.microsoft.com/office/drawing/2014/main" id="{49478C39-79FE-43DB-B774-2DA03F700A33}"/>
-              </a:ext>
-            </a:extLst>
-          </p:cNvPr>
-          <p:cNvSpPr>
-            <a:spLocks noGrp="1"/>
-          </p:cNvSpPr>
-          <p:nvPr>
-            <p:ph type="ftr" sz="quarter" idx="11"/>
-          </p:nvPr>
-        </p:nvSpPr>
-        <p:spPr/>
-        <p:txBody>
-          <a:bodyPr/>
-          <a:lstStyle/>
-          <a:p>
-            <a:r>
-              <a:rPr lang="en-US"/>
-              <a:t>Materials by Adi Sarid https://adisarid.github.io and http://www.sarid-ins.com</a:t>
-            </a:r>
-            <a:endParaRPr lang="en-US" dirty="0"/>
-          </a:p>
-        </p:txBody>
-      </p:sp>
-      <p:sp>
-        <p:nvSpPr>
-          <p:cNvPr id="5" name="Slide Number Placeholder 4">
-            <a:extLst>
-              <a:ext uri="{FF2B5EF4-FFF2-40B4-BE49-F238E27FC236}">
-                <a16:creationId xmlns:a16="http://schemas.microsoft.com/office/drawing/2014/main" id="{DAB25C23-1D89-4AA2-998E-F7B9F0C35768}"/>
-              </a:ext>
-            </a:extLst>
-          </p:cNvPr>
-          <p:cNvSpPr>
-            <a:spLocks noGrp="1"/>
-          </p:cNvSpPr>
-          <p:nvPr>
-            <p:ph type="sldNum" sz="quarter" idx="12"/>
-          </p:nvPr>
-        </p:nvSpPr>
-        <p:spPr/>
-        <p:txBody>
-          <a:bodyPr/>
-          <a:lstStyle/>
-          <a:p>
-            <a:fld id="{4FAB73BC-B049-4115-A692-8D63A059BFB8}" type="slidenum">
-              <a:rPr lang="en-US" smtClean="0"/>
-              <a:t>3</a:t>
-            </a:fld>
-            <a:endParaRPr lang="en-US" dirty="0"/>
-          </a:p>
-        </p:txBody>
-      </p:sp>
-    </p:spTree>
-    <p:extLst>
-      <p:ext uri="{BB962C8B-B14F-4D97-AF65-F5344CB8AC3E}">
-        <p14:creationId xmlns:p14="http://schemas.microsoft.com/office/powerpoint/2010/main" val="800250464"/>
-      </p:ext>
-    </p:extLst>
-  </p:cSld>
-  <p:clrMapOvr>
-    <a:masterClrMapping/>
-  </p:clrMapOvr>
-</p:sld>
-</file>
-
-<file path=ppt/slides/slide4.xml><?xml version="1.0" encoding="utf-8"?>
-<p:sld xmlns:a="http://schemas.openxmlformats.org/drawingml/2006/main" xmlns:r="http://schemas.openxmlformats.org/officeDocument/2006/relationships" xmlns:p="http://schemas.openxmlformats.org/presentationml/2006/main">
-  <p:cSld>
-    <p:spTree>
-      <p:nvGrpSpPr>
-        <p:cNvPr id="1" name=""/>
-        <p:cNvGrpSpPr/>
-        <p:nvPr/>
-      </p:nvGrpSpPr>
-      <p:grpSpPr>
-        <a:xfrm>
-          <a:off x="0" y="0"/>
-          <a:ext cx="0" cy="0"/>
-          <a:chOff x="0" y="0"/>
-          <a:chExt cx="0" cy="0"/>
-        </a:xfrm>
-      </p:grpSpPr>
-      <p:sp>
-        <p:nvSpPr>
-          <p:cNvPr id="2" name="Title 1">
-            <a:extLst>
-              <a:ext uri="{FF2B5EF4-FFF2-40B4-BE49-F238E27FC236}">
-                <a16:creationId xmlns:a16="http://schemas.microsoft.com/office/drawing/2014/main" id="{89180BCA-BF5C-441D-9DDD-F8A913063388}"/>
-              </a:ext>
-            </a:extLst>
-          </p:cNvPr>
-          <p:cNvSpPr>
-            <a:spLocks noGrp="1"/>
-          </p:cNvSpPr>
-          <p:nvPr>
-            <p:ph type="title"/>
-          </p:nvPr>
-        </p:nvSpPr>
-        <p:spPr/>
-        <p:txBody>
-          <a:bodyPr/>
-          <a:lstStyle/>
-          <a:p>
-            <a:r>
-              <a:rPr lang="en-US" dirty="0"/>
-              <a:t>A functional</a:t>
-            </a:r>
-            <a:endParaRPr lang="en-IL" dirty="0"/>
-          </a:p>
-        </p:txBody>
-      </p:sp>
-      <p:sp>
-        <p:nvSpPr>
-          <p:cNvPr id="3" name="Content Placeholder 2">
-            <a:extLst>
-              <a:ext uri="{FF2B5EF4-FFF2-40B4-BE49-F238E27FC236}">
-                <a16:creationId xmlns:a16="http://schemas.microsoft.com/office/drawing/2014/main" id="{5B037B4C-714F-4C6C-BB15-C878FDAC84D9}"/>
-              </a:ext>
-            </a:extLst>
-          </p:cNvPr>
-          <p:cNvSpPr>
-            <a:spLocks noGrp="1"/>
-          </p:cNvSpPr>
-          <p:nvPr>
-            <p:ph idx="1"/>
-          </p:nvPr>
-        </p:nvSpPr>
-        <p:spPr/>
-        <p:txBody>
-          <a:bodyPr/>
-          <a:lstStyle/>
-          <a:p>
-            <a:r>
-              <a:rPr lang="en-US" dirty="0"/>
-              <a:t>Functional is a function that takes a function as an input and returns a vector as an output (like in math), e.g.:</a:t>
-            </a:r>
-          </a:p>
-          <a:p>
-            <a:pPr marL="0" indent="0">
-              <a:buNone/>
-            </a:pPr>
-            <a:r>
-              <a:rPr lang="en-US" dirty="0">
-                <a:latin typeface="Courier New" panose="02070309020205020404" pitchFamily="49" charset="0"/>
-                <a:cs typeface="Courier New" panose="02070309020205020404" pitchFamily="49" charset="0"/>
-              </a:rPr>
-              <a:t>randomize &lt;- function(f) f(</a:t>
-            </a:r>
-            <a:r>
-              <a:rPr lang="en-US" dirty="0" err="1">
-                <a:latin typeface="Courier New" panose="02070309020205020404" pitchFamily="49" charset="0"/>
-                <a:cs typeface="Courier New" panose="02070309020205020404" pitchFamily="49" charset="0"/>
-              </a:rPr>
-              <a:t>runif</a:t>
-            </a:r>
-            <a:r>
-              <a:rPr lang="en-US" dirty="0">
-                <a:latin typeface="Courier New" panose="02070309020205020404" pitchFamily="49" charset="0"/>
-                <a:cs typeface="Courier New" panose="02070309020205020404" pitchFamily="49" charset="0"/>
-              </a:rPr>
-              <a:t>(1e3))</a:t>
-            </a:r>
-          </a:p>
-          <a:p>
-            <a:pPr marL="0" indent="0">
-              <a:buNone/>
-            </a:pPr>
-            <a:r>
-              <a:rPr lang="en-US" dirty="0">
-                <a:latin typeface="Courier New" panose="02070309020205020404" pitchFamily="49" charset="0"/>
-                <a:cs typeface="Courier New" panose="02070309020205020404" pitchFamily="49" charset="0"/>
-              </a:rPr>
-              <a:t>randomize(mean)</a:t>
-            </a:r>
-          </a:p>
-          <a:p>
-            <a:pPr marL="0" indent="0">
-              <a:buNone/>
-            </a:pPr>
-            <a:r>
-              <a:rPr lang="en-US" dirty="0">
-                <a:latin typeface="Courier New" panose="02070309020205020404" pitchFamily="49" charset="0"/>
-                <a:cs typeface="Courier New" panose="02070309020205020404" pitchFamily="49" charset="0"/>
-              </a:rPr>
-              <a:t>randomize(</a:t>
-            </a:r>
-            <a:r>
-              <a:rPr lang="en-US" dirty="0" err="1">
-                <a:latin typeface="Courier New" panose="02070309020205020404" pitchFamily="49" charset="0"/>
-                <a:cs typeface="Courier New" panose="02070309020205020404" pitchFamily="49" charset="0"/>
-              </a:rPr>
-              <a:t>sd</a:t>
-            </a:r>
-            <a:r>
-              <a:rPr lang="en-US" dirty="0">
-                <a:latin typeface="Courier New" panose="02070309020205020404" pitchFamily="49" charset="0"/>
-                <a:cs typeface="Courier New" panose="02070309020205020404" pitchFamily="49" charset="0"/>
-              </a:rPr>
-              <a:t>)</a:t>
-            </a:r>
-          </a:p>
-          <a:p>
-            <a:pPr marL="0" indent="0">
-              <a:buNone/>
-            </a:pPr>
-            <a:r>
-              <a:rPr lang="en-US" dirty="0">
-                <a:latin typeface="Courier New" panose="02070309020205020404" pitchFamily="49" charset="0"/>
-                <a:cs typeface="Courier New" panose="02070309020205020404" pitchFamily="49" charset="0"/>
-              </a:rPr>
-              <a:t>randomize(plot)</a:t>
-            </a:r>
-          </a:p>
-          <a:p>
-            <a:pPr marL="0" indent="0">
-              <a:buNone/>
-            </a:pPr>
-            <a:r>
-              <a:rPr lang="en-US" dirty="0">
-                <a:latin typeface="Courier New" panose="02070309020205020404" pitchFamily="49" charset="0"/>
-                <a:cs typeface="Courier New" panose="02070309020205020404" pitchFamily="49" charset="0"/>
-              </a:rPr>
-              <a:t>integrate(sin, lower = 0, upper = pi/2)</a:t>
-            </a:r>
-          </a:p>
-          <a:p>
-            <a:pPr marL="0" indent="0">
-              <a:buNone/>
-            </a:pPr>
-            <a:r>
-              <a:rPr lang="en-US" dirty="0">
-                <a:latin typeface="Courier New" panose="02070309020205020404" pitchFamily="49" charset="0"/>
-                <a:cs typeface="Courier New" panose="02070309020205020404" pitchFamily="49" charset="0"/>
-              </a:rPr>
-              <a:t>map, </a:t>
-            </a:r>
-            <a:r>
-              <a:rPr lang="en-US" dirty="0" err="1">
-                <a:latin typeface="Courier New" panose="02070309020205020404" pitchFamily="49" charset="0"/>
-                <a:cs typeface="Courier New" panose="02070309020205020404" pitchFamily="49" charset="0"/>
-              </a:rPr>
-              <a:t>lapply</a:t>
-            </a:r>
-            <a:r>
-              <a:rPr lang="en-US" dirty="0">
-                <a:latin typeface="Courier New" panose="02070309020205020404" pitchFamily="49" charset="0"/>
-                <a:cs typeface="Courier New" panose="02070309020205020404" pitchFamily="49" charset="0"/>
-              </a:rPr>
-              <a:t>, apply,…</a:t>
-            </a:r>
-            <a:endParaRPr lang="en-IL" dirty="0">
-              <a:latin typeface="Courier New" panose="02070309020205020404" pitchFamily="49" charset="0"/>
-              <a:cs typeface="Courier New" panose="02070309020205020404" pitchFamily="49" charset="0"/>
-            </a:endParaRPr>
-          </a:p>
-        </p:txBody>
-      </p:sp>
-      <p:sp>
-        <p:nvSpPr>
-          <p:cNvPr id="4" name="Footer Placeholder 3">
-            <a:extLst>
-              <a:ext uri="{FF2B5EF4-FFF2-40B4-BE49-F238E27FC236}">
-                <a16:creationId xmlns:a16="http://schemas.microsoft.com/office/drawing/2014/main" id="{E5513B86-F51A-4AD7-9D59-4E73D9692F17}"/>
-              </a:ext>
-            </a:extLst>
-          </p:cNvPr>
-          <p:cNvSpPr>
-            <a:spLocks noGrp="1"/>
-          </p:cNvSpPr>
-          <p:nvPr>
-            <p:ph type="ftr" sz="quarter" idx="11"/>
-          </p:nvPr>
-        </p:nvSpPr>
-        <p:spPr/>
-        <p:txBody>
-          <a:bodyPr/>
-          <a:lstStyle/>
-          <a:p>
-            <a:r>
-              <a:rPr lang="en-US"/>
-              <a:t>Materials by Adi Sarid https://adisarid.github.io and http://www.sarid-ins.com</a:t>
-            </a:r>
-            <a:endParaRPr lang="en-US" dirty="0"/>
-          </a:p>
-        </p:txBody>
-      </p:sp>
-      <p:sp>
-        <p:nvSpPr>
-          <p:cNvPr id="5" name="Slide Number Placeholder 4">
-            <a:extLst>
-              <a:ext uri="{FF2B5EF4-FFF2-40B4-BE49-F238E27FC236}">
-                <a16:creationId xmlns:a16="http://schemas.microsoft.com/office/drawing/2014/main" id="{E225B4B7-FDBE-4C4C-BC33-E27BAA8072FB}"/>
-              </a:ext>
-            </a:extLst>
-          </p:cNvPr>
-          <p:cNvSpPr>
-            <a:spLocks noGrp="1"/>
-          </p:cNvSpPr>
-          <p:nvPr>
-            <p:ph type="sldNum" sz="quarter" idx="12"/>
-          </p:nvPr>
-        </p:nvSpPr>
-        <p:spPr/>
-        <p:txBody>
-          <a:bodyPr/>
-          <a:lstStyle/>
-          <a:p>
-            <a:fld id="{4FAB73BC-B049-4115-A692-8D63A059BFB8}" type="slidenum">
-              <a:rPr lang="en-US" smtClean="0"/>
-              <a:t>4</a:t>
-            </a:fld>
-            <a:endParaRPr lang="en-US" dirty="0"/>
-          </a:p>
-        </p:txBody>
-      </p:sp>
-    </p:spTree>
-    <p:extLst>
-      <p:ext uri="{BB962C8B-B14F-4D97-AF65-F5344CB8AC3E}">
-        <p14:creationId xmlns:p14="http://schemas.microsoft.com/office/powerpoint/2010/main" val="202388887"/>
-      </p:ext>
-    </p:extLst>
-  </p:cSld>
-  <p:clrMapOvr>
-    <a:masterClrMapping/>
-  </p:clrMapOvr>
-</p:sld>
-</file>
-
-<file path=ppt/slides/slide5.xml><?xml version="1.0" encoding="utf-8"?>
-<p:sld xmlns:a="http://schemas.openxmlformats.org/drawingml/2006/main" xmlns:r="http://schemas.openxmlformats.org/officeDocument/2006/relationships" xmlns:p="http://schemas.openxmlformats.org/presentationml/2006/main">
-  <p:cSld>
-    <p:spTree>
-      <p:nvGrpSpPr>
-        <p:cNvPr id="1" name=""/>
-        <p:cNvGrpSpPr/>
-        <p:nvPr/>
-      </p:nvGrpSpPr>
-      <p:grpSpPr>
-        <a:xfrm>
-          <a:off x="0" y="0"/>
-          <a:ext cx="0" cy="0"/>
-          <a:chOff x="0" y="0"/>
-          <a:chExt cx="0" cy="0"/>
-        </a:xfrm>
-      </p:grpSpPr>
-      <p:sp>
-        <p:nvSpPr>
-          <p:cNvPr id="2" name="Title 1">
-            <a:extLst>
-              <a:ext uri="{FF2B5EF4-FFF2-40B4-BE49-F238E27FC236}">
-                <a16:creationId xmlns:a16="http://schemas.microsoft.com/office/drawing/2014/main" id="{4E845991-19E7-46CE-A706-A6AB32FB95DB}"/>
-              </a:ext>
-            </a:extLst>
-          </p:cNvPr>
-          <p:cNvSpPr>
-            <a:spLocks noGrp="1"/>
-          </p:cNvSpPr>
-          <p:nvPr>
-            <p:ph type="title"/>
-          </p:nvPr>
-        </p:nvSpPr>
-        <p:spPr/>
-        <p:txBody>
-          <a:bodyPr/>
-          <a:lstStyle/>
-          <a:p>
-            <a:r>
-              <a:rPr lang="en-US" dirty="0"/>
-              <a:t>Be specific</a:t>
-            </a:r>
-            <a:endParaRPr lang="en-IL" dirty="0"/>
-          </a:p>
-        </p:txBody>
-      </p:sp>
-      <p:sp>
-        <p:nvSpPr>
-          <p:cNvPr id="3" name="Content Placeholder 2">
-            <a:extLst>
-              <a:ext uri="{FF2B5EF4-FFF2-40B4-BE49-F238E27FC236}">
-                <a16:creationId xmlns:a16="http://schemas.microsoft.com/office/drawing/2014/main" id="{7F742DAE-0B4B-4BD3-88E6-476E488ED7F5}"/>
-              </a:ext>
-            </a:extLst>
-          </p:cNvPr>
-          <p:cNvSpPr>
-            <a:spLocks noGrp="1"/>
-          </p:cNvSpPr>
-          <p:nvPr>
-            <p:ph idx="1"/>
-          </p:nvPr>
-        </p:nvSpPr>
-        <p:spPr/>
-        <p:txBody>
-          <a:bodyPr/>
-          <a:lstStyle/>
-          <a:p>
-            <a:r>
-              <a:rPr lang="en-US" dirty="0"/>
-              <a:t>As a “best practice”, when you are using iterations, you should be as specific as possible, and pre-allocate as much as possible.</a:t>
-            </a:r>
-          </a:p>
-          <a:p>
-            <a:r>
-              <a:rPr lang="en-US" dirty="0"/>
-              <a:t>In other words your preference should be:</a:t>
-            </a:r>
-          </a:p>
-          <a:p>
-            <a:pPr lvl="1"/>
-            <a:r>
-              <a:rPr lang="en-US" dirty="0" err="1"/>
-              <a:t>purrr</a:t>
-            </a:r>
-            <a:r>
-              <a:rPr lang="en-US" dirty="0"/>
-              <a:t> &gt; for &gt; while &gt; repeat</a:t>
-            </a:r>
-          </a:p>
-          <a:p>
-            <a:endParaRPr lang="en-IL" dirty="0"/>
-          </a:p>
-        </p:txBody>
-      </p:sp>
-      <p:sp>
-        <p:nvSpPr>
-          <p:cNvPr id="4" name="Footer Placeholder 3">
-            <a:extLst>
-              <a:ext uri="{FF2B5EF4-FFF2-40B4-BE49-F238E27FC236}">
-                <a16:creationId xmlns:a16="http://schemas.microsoft.com/office/drawing/2014/main" id="{86DFC2BD-5534-4B78-A616-48FE5D57B7E7}"/>
-              </a:ext>
-            </a:extLst>
-          </p:cNvPr>
-          <p:cNvSpPr>
-            <a:spLocks noGrp="1"/>
-          </p:cNvSpPr>
-          <p:nvPr>
-            <p:ph type="ftr" sz="quarter" idx="11"/>
-          </p:nvPr>
-        </p:nvSpPr>
-        <p:spPr/>
-        <p:txBody>
-          <a:bodyPr/>
-          <a:lstStyle/>
-          <a:p>
-            <a:r>
-              <a:rPr lang="en-US"/>
-              <a:t>Materials by Adi Sarid https://adisarid.github.io and http://www.sarid-ins.com</a:t>
-            </a:r>
-            <a:endParaRPr lang="en-US" dirty="0"/>
-          </a:p>
-        </p:txBody>
-      </p:sp>
-      <p:sp>
-        <p:nvSpPr>
-          <p:cNvPr id="5" name="Slide Number Placeholder 4">
-            <a:extLst>
-              <a:ext uri="{FF2B5EF4-FFF2-40B4-BE49-F238E27FC236}">
-                <a16:creationId xmlns:a16="http://schemas.microsoft.com/office/drawing/2014/main" id="{04CE614E-9172-45D0-B7BA-66D99F548630}"/>
-              </a:ext>
-            </a:extLst>
-          </p:cNvPr>
-          <p:cNvSpPr>
-            <a:spLocks noGrp="1"/>
-          </p:cNvSpPr>
-          <p:nvPr>
-            <p:ph type="sldNum" sz="quarter" idx="12"/>
-          </p:nvPr>
-        </p:nvSpPr>
-        <p:spPr/>
-        <p:txBody>
-          <a:bodyPr/>
-          <a:lstStyle/>
-          <a:p>
-            <a:fld id="{4FAB73BC-B049-4115-A692-8D63A059BFB8}" type="slidenum">
-              <a:rPr lang="en-US" smtClean="0"/>
-              <a:t>5</a:t>
-            </a:fld>
-            <a:endParaRPr lang="en-US" dirty="0"/>
-          </a:p>
-        </p:txBody>
-      </p:sp>
-    </p:spTree>
-    <p:extLst>
-      <p:ext uri="{BB962C8B-B14F-4D97-AF65-F5344CB8AC3E}">
-        <p14:creationId xmlns:p14="http://schemas.microsoft.com/office/powerpoint/2010/main" val="1285495968"/>
-      </p:ext>
-    </p:extLst>
-  </p:cSld>
-  <p:clrMapOvr>
-    <a:masterClrMapping/>
-  </p:clrMapOvr>
-</p:sld>
-</file>
-
-<file path=ppt/slides/slide6.xml><?xml version="1.0" encoding="utf-8"?>
-<p:sld xmlns:a="http://schemas.openxmlformats.org/drawingml/2006/main" xmlns:r="http://schemas.openxmlformats.org/officeDocument/2006/relationships" xmlns:p="http://schemas.openxmlformats.org/presentationml/2006/main">
-  <p:cSld>
-    <p:spTree>
-      <p:nvGrpSpPr>
-        <p:cNvPr id="1" name=""/>
-        <p:cNvGrpSpPr/>
-        <p:nvPr/>
-      </p:nvGrpSpPr>
-      <p:grpSpPr>
-        <a:xfrm>
-          <a:off x="0" y="0"/>
-          <a:ext cx="0" cy="0"/>
-          <a:chOff x="0" y="0"/>
-          <a:chExt cx="0" cy="0"/>
-        </a:xfrm>
-      </p:grpSpPr>
-      <p:sp>
-        <p:nvSpPr>
-          <p:cNvPr id="2" name="Title 1">
-            <a:extLst>
-              <a:ext uri="{FF2B5EF4-FFF2-40B4-BE49-F238E27FC236}">
-                <a16:creationId xmlns:a16="http://schemas.microsoft.com/office/drawing/2014/main" id="{DE376234-FF2E-49D6-B9EB-716F60664C94}"/>
-              </a:ext>
-            </a:extLst>
-          </p:cNvPr>
-          <p:cNvSpPr>
-            <a:spLocks noGrp="1"/>
-          </p:cNvSpPr>
-          <p:nvPr>
-            <p:ph type="title"/>
-          </p:nvPr>
-        </p:nvSpPr>
-        <p:spPr/>
-        <p:txBody>
-          <a:bodyPr/>
-          <a:lstStyle/>
-          <a:p>
-            <a:r>
-              <a:rPr lang="en-US" dirty="0" err="1"/>
-              <a:t>purrr</a:t>
-            </a:r>
-            <a:r>
-              <a:rPr lang="en-US" dirty="0"/>
-              <a:t>::map</a:t>
-            </a:r>
-            <a:endParaRPr lang="en-IL" dirty="0"/>
-          </a:p>
-        </p:txBody>
-      </p:sp>
-      <p:sp>
-        <p:nvSpPr>
-          <p:cNvPr id="3" name="Content Placeholder 2">
-            <a:extLst>
-              <a:ext uri="{FF2B5EF4-FFF2-40B4-BE49-F238E27FC236}">
-                <a16:creationId xmlns:a16="http://schemas.microsoft.com/office/drawing/2014/main" id="{D550A6E6-1042-415F-AD8A-943DFD49D2EB}"/>
-              </a:ext>
-            </a:extLst>
-          </p:cNvPr>
-          <p:cNvSpPr>
-            <a:spLocks noGrp="1"/>
-          </p:cNvSpPr>
-          <p:nvPr>
-            <p:ph idx="1"/>
-          </p:nvPr>
-        </p:nvSpPr>
-        <p:spPr/>
-        <p:txBody>
-          <a:bodyPr/>
-          <a:lstStyle/>
-          <a:p>
-            <a:r>
-              <a:rPr lang="en-US" dirty="0"/>
-              <a:t>Takes a vector and a function and does this:</a:t>
-            </a:r>
-          </a:p>
-          <a:p>
-            <a:r>
-              <a:rPr lang="en-US" dirty="0"/>
-              <a:t>The </a:t>
-            </a:r>
-            <a:r>
-              <a:rPr lang="en-US" b="1" dirty="0"/>
-              <a:t>implementation is in C code</a:t>
-            </a:r>
-            <a:r>
-              <a:rPr lang="en-US" dirty="0"/>
-              <a:t>, </a:t>
-            </a:r>
-          </a:p>
-          <a:p>
-            <a:r>
-              <a:rPr lang="en-US" dirty="0"/>
-              <a:t>but is equivalent logically to something like:</a:t>
-            </a:r>
-          </a:p>
-          <a:p>
-            <a:pPr marL="0" indent="0">
-              <a:buNone/>
-            </a:pPr>
-            <a:r>
-              <a:rPr lang="en-US" sz="1200" dirty="0" err="1">
-                <a:latin typeface="Courier New" panose="02070309020205020404" pitchFamily="49" charset="0"/>
-                <a:cs typeface="Courier New" panose="02070309020205020404" pitchFamily="49" charset="0"/>
-              </a:rPr>
-              <a:t>simple_map</a:t>
-            </a:r>
-            <a:r>
-              <a:rPr lang="en-US" sz="1200" dirty="0">
-                <a:latin typeface="Courier New" panose="02070309020205020404" pitchFamily="49" charset="0"/>
-                <a:cs typeface="Courier New" panose="02070309020205020404" pitchFamily="49" charset="0"/>
-              </a:rPr>
-              <a:t> &lt;- function(x, f, ...) {</a:t>
-            </a:r>
-            <a:br>
-              <a:rPr lang="en-US" sz="1200" dirty="0">
-                <a:latin typeface="Courier New" panose="02070309020205020404" pitchFamily="49" charset="0"/>
-                <a:cs typeface="Courier New" panose="02070309020205020404" pitchFamily="49" charset="0"/>
-              </a:rPr>
-            </a:br>
-            <a:r>
-              <a:rPr lang="en-US" sz="1200" dirty="0">
-                <a:latin typeface="Courier New" panose="02070309020205020404" pitchFamily="49" charset="0"/>
-                <a:cs typeface="Courier New" panose="02070309020205020404" pitchFamily="49" charset="0"/>
-              </a:rPr>
-              <a:t>   out &lt;- vector("list", length(x))</a:t>
-            </a:r>
-            <a:br>
-              <a:rPr lang="en-US" sz="1200" dirty="0">
-                <a:latin typeface="Courier New" panose="02070309020205020404" pitchFamily="49" charset="0"/>
-                <a:cs typeface="Courier New" panose="02070309020205020404" pitchFamily="49" charset="0"/>
-              </a:rPr>
-            </a:br>
-            <a:r>
-              <a:rPr lang="en-US" sz="1200" dirty="0">
-                <a:latin typeface="Courier New" panose="02070309020205020404" pitchFamily="49" charset="0"/>
-                <a:cs typeface="Courier New" panose="02070309020205020404" pitchFamily="49" charset="0"/>
-              </a:rPr>
-              <a:t>   for (</a:t>
-            </a:r>
-            <a:r>
-              <a:rPr lang="en-US" sz="1200" dirty="0" err="1">
-                <a:latin typeface="Courier New" panose="02070309020205020404" pitchFamily="49" charset="0"/>
-                <a:cs typeface="Courier New" panose="02070309020205020404" pitchFamily="49" charset="0"/>
-              </a:rPr>
-              <a:t>i</a:t>
-            </a:r>
-            <a:r>
-              <a:rPr lang="en-US" sz="1200" dirty="0">
-                <a:latin typeface="Courier New" panose="02070309020205020404" pitchFamily="49" charset="0"/>
-                <a:cs typeface="Courier New" panose="02070309020205020404" pitchFamily="49" charset="0"/>
-              </a:rPr>
-              <a:t> in </a:t>
-            </a:r>
-            <a:r>
-              <a:rPr lang="en-US" sz="1200" dirty="0" err="1">
-                <a:latin typeface="Courier New" panose="02070309020205020404" pitchFamily="49" charset="0"/>
-                <a:cs typeface="Courier New" panose="02070309020205020404" pitchFamily="49" charset="0"/>
-              </a:rPr>
-              <a:t>seq_along</a:t>
-            </a:r>
-            <a:r>
-              <a:rPr lang="en-US" sz="1200" dirty="0">
-                <a:latin typeface="Courier New" panose="02070309020205020404" pitchFamily="49" charset="0"/>
-                <a:cs typeface="Courier New" panose="02070309020205020404" pitchFamily="49" charset="0"/>
-              </a:rPr>
-              <a:t>(x)) {</a:t>
-            </a:r>
-            <a:br>
-              <a:rPr lang="en-US" sz="1200" dirty="0">
-                <a:latin typeface="Courier New" panose="02070309020205020404" pitchFamily="49" charset="0"/>
-                <a:cs typeface="Courier New" panose="02070309020205020404" pitchFamily="49" charset="0"/>
-              </a:rPr>
-            </a:br>
-            <a:r>
-              <a:rPr lang="en-US" sz="1200" dirty="0">
-                <a:latin typeface="Courier New" panose="02070309020205020404" pitchFamily="49" charset="0"/>
-                <a:cs typeface="Courier New" panose="02070309020205020404" pitchFamily="49" charset="0"/>
-              </a:rPr>
-              <a:t>      out[[</a:t>
-            </a:r>
-            <a:r>
-              <a:rPr lang="en-US" sz="1200" dirty="0" err="1">
-                <a:latin typeface="Courier New" panose="02070309020205020404" pitchFamily="49" charset="0"/>
-                <a:cs typeface="Courier New" panose="02070309020205020404" pitchFamily="49" charset="0"/>
-              </a:rPr>
-              <a:t>i</a:t>
-            </a:r>
-            <a:r>
-              <a:rPr lang="en-US" sz="1200" dirty="0">
-                <a:latin typeface="Courier New" panose="02070309020205020404" pitchFamily="49" charset="0"/>
-                <a:cs typeface="Courier New" panose="02070309020205020404" pitchFamily="49" charset="0"/>
-              </a:rPr>
-              <a:t>]] &lt;- f(x[[</a:t>
-            </a:r>
-            <a:r>
-              <a:rPr lang="en-US" sz="1200" dirty="0" err="1">
-                <a:latin typeface="Courier New" panose="02070309020205020404" pitchFamily="49" charset="0"/>
-                <a:cs typeface="Courier New" panose="02070309020205020404" pitchFamily="49" charset="0"/>
-              </a:rPr>
-              <a:t>i</a:t>
-            </a:r>
-            <a:r>
-              <a:rPr lang="en-US" sz="1200" dirty="0">
-                <a:latin typeface="Courier New" panose="02070309020205020404" pitchFamily="49" charset="0"/>
-                <a:cs typeface="Courier New" panose="02070309020205020404" pitchFamily="49" charset="0"/>
-              </a:rPr>
-              <a:t>]], ...)</a:t>
-            </a:r>
-            <a:br>
-              <a:rPr lang="en-US" sz="1200" dirty="0">
-                <a:latin typeface="Courier New" panose="02070309020205020404" pitchFamily="49" charset="0"/>
-                <a:cs typeface="Courier New" panose="02070309020205020404" pitchFamily="49" charset="0"/>
-              </a:rPr>
-            </a:br>
-            <a:r>
-              <a:rPr lang="en-US" sz="1200" dirty="0">
-                <a:latin typeface="Courier New" panose="02070309020205020404" pitchFamily="49" charset="0"/>
-                <a:cs typeface="Courier New" panose="02070309020205020404" pitchFamily="49" charset="0"/>
-              </a:rPr>
-              <a:t>   }</a:t>
-            </a:r>
-            <a:br>
-              <a:rPr lang="en-US" sz="1200" dirty="0">
-                <a:latin typeface="Courier New" panose="02070309020205020404" pitchFamily="49" charset="0"/>
-                <a:cs typeface="Courier New" panose="02070309020205020404" pitchFamily="49" charset="0"/>
-              </a:rPr>
-            </a:br>
-            <a:r>
-              <a:rPr lang="en-US" sz="1200" dirty="0">
-                <a:latin typeface="Courier New" panose="02070309020205020404" pitchFamily="49" charset="0"/>
-                <a:cs typeface="Courier New" panose="02070309020205020404" pitchFamily="49" charset="0"/>
-              </a:rPr>
-              <a:t>   out</a:t>
-            </a:r>
-            <a:br>
-              <a:rPr lang="en-US" sz="1200" dirty="0">
-                <a:latin typeface="Courier New" panose="02070309020205020404" pitchFamily="49" charset="0"/>
-                <a:cs typeface="Courier New" panose="02070309020205020404" pitchFamily="49" charset="0"/>
-              </a:rPr>
-            </a:br>
-            <a:r>
-              <a:rPr lang="en-US" sz="1200" dirty="0">
-                <a:latin typeface="Courier New" panose="02070309020205020404" pitchFamily="49" charset="0"/>
-                <a:cs typeface="Courier New" panose="02070309020205020404" pitchFamily="49" charset="0"/>
-              </a:rPr>
-              <a:t>}</a:t>
-            </a:r>
-          </a:p>
-          <a:p>
-            <a:pPr marL="0" indent="0">
-              <a:buNone/>
-            </a:pPr>
-            <a:endParaRPr lang="en-IL" sz="1200" dirty="0">
-              <a:latin typeface="Courier New" panose="02070309020205020404" pitchFamily="49" charset="0"/>
-              <a:cs typeface="Courier New" panose="02070309020205020404" pitchFamily="49" charset="0"/>
-            </a:endParaRPr>
-          </a:p>
-          <a:p>
-            <a:r>
-              <a:rPr lang="en-US" dirty="0"/>
-              <a:t>map() returns a list, </a:t>
-            </a:r>
-            <a:r>
-              <a:rPr lang="en-US" dirty="0" err="1"/>
-              <a:t>map_dbl</a:t>
-            </a:r>
-            <a:r>
-              <a:rPr lang="en-US" dirty="0"/>
-              <a:t>(), </a:t>
-            </a:r>
-            <a:r>
-              <a:rPr lang="en-US" dirty="0" err="1"/>
-              <a:t>map_lgl</a:t>
-            </a:r>
-            <a:r>
-              <a:rPr lang="en-US" dirty="0"/>
-              <a:t>(), </a:t>
-            </a:r>
-            <a:r>
-              <a:rPr lang="en-US" dirty="0" err="1"/>
-              <a:t>map_int</a:t>
-            </a:r>
-            <a:r>
-              <a:rPr lang="en-US" dirty="0"/>
-              <a:t>(), </a:t>
-            </a:r>
-            <a:r>
-              <a:rPr lang="en-US" dirty="0" err="1"/>
-              <a:t>map_chr</a:t>
-            </a:r>
-            <a:r>
-              <a:rPr lang="en-US" dirty="0"/>
-              <a:t>() return a </a:t>
-            </a:r>
-            <a:r>
-              <a:rPr lang="en-US" dirty="0" err="1"/>
-              <a:t>vecor</a:t>
-            </a:r>
-            <a:r>
-              <a:rPr lang="en-US" dirty="0"/>
-              <a:t> of type double, logical, integer, and character.</a:t>
-            </a:r>
-          </a:p>
-        </p:txBody>
-      </p:sp>
-      <p:sp>
-        <p:nvSpPr>
-          <p:cNvPr id="4" name="Footer Placeholder 3">
-            <a:extLst>
-              <a:ext uri="{FF2B5EF4-FFF2-40B4-BE49-F238E27FC236}">
-                <a16:creationId xmlns:a16="http://schemas.microsoft.com/office/drawing/2014/main" id="{47CCA91D-765B-4BD0-80FE-07F0351E5727}"/>
-              </a:ext>
-            </a:extLst>
-          </p:cNvPr>
-          <p:cNvSpPr>
-            <a:spLocks noGrp="1"/>
-          </p:cNvSpPr>
-          <p:nvPr>
-            <p:ph type="ftr" sz="quarter" idx="11"/>
-          </p:nvPr>
-        </p:nvSpPr>
-        <p:spPr/>
-        <p:txBody>
-          <a:bodyPr/>
-          <a:lstStyle/>
-          <a:p>
-            <a:r>
-              <a:rPr lang="en-US"/>
-              <a:t>Materials by Adi Sarid https://adisarid.github.io and http://www.sarid-ins.com</a:t>
-            </a:r>
-            <a:endParaRPr lang="en-US" dirty="0"/>
-          </a:p>
-        </p:txBody>
-      </p:sp>
-      <p:sp>
-        <p:nvSpPr>
-          <p:cNvPr id="5" name="Slide Number Placeholder 4">
-            <a:extLst>
-              <a:ext uri="{FF2B5EF4-FFF2-40B4-BE49-F238E27FC236}">
-                <a16:creationId xmlns:a16="http://schemas.microsoft.com/office/drawing/2014/main" id="{EFDC0F16-25B5-4F02-B3FA-CA058A17C590}"/>
-              </a:ext>
-            </a:extLst>
-          </p:cNvPr>
-          <p:cNvSpPr>
-            <a:spLocks noGrp="1"/>
-          </p:cNvSpPr>
-          <p:nvPr>
-            <p:ph type="sldNum" sz="quarter" idx="12"/>
-          </p:nvPr>
-        </p:nvSpPr>
-        <p:spPr/>
-        <p:txBody>
-          <a:bodyPr/>
-          <a:lstStyle/>
-          <a:p>
-            <a:fld id="{4FAB73BC-B049-4115-A692-8D63A059BFB8}" type="slidenum">
-              <a:rPr lang="en-US" smtClean="0"/>
-              <a:t>6</a:t>
-            </a:fld>
-            <a:endParaRPr lang="en-US" dirty="0"/>
-          </a:p>
-        </p:txBody>
-      </p:sp>
-      <p:pic>
-        <p:nvPicPr>
-          <p:cNvPr id="6" name="Picture 5">
-            <a:extLst>
-              <a:ext uri="{FF2B5EF4-FFF2-40B4-BE49-F238E27FC236}">
-                <a16:creationId xmlns:a16="http://schemas.microsoft.com/office/drawing/2014/main" id="{A3C058F5-DE12-4D5A-88E5-26297C2459A7}"/>
-              </a:ext>
-            </a:extLst>
-          </p:cNvPr>
-          <p:cNvPicPr>
-            <a:picLocks noChangeAspect="1"/>
-          </p:cNvPicPr>
-          <p:nvPr/>
-        </p:nvPicPr>
-        <p:blipFill>
-          <a:blip r:embed="rId2"/>
-          <a:stretch>
-            <a:fillRect/>
-          </a:stretch>
-        </p:blipFill>
-        <p:spPr>
-          <a:xfrm>
-            <a:off x="7976501" y="1423358"/>
-            <a:ext cx="2475699" cy="1892060"/>
-          </a:xfrm>
-          <a:prstGeom prst="rect">
-            <a:avLst/>
-          </a:prstGeom>
-        </p:spPr>
-      </p:pic>
-    </p:spTree>
-    <p:extLst>
-      <p:ext uri="{BB962C8B-B14F-4D97-AF65-F5344CB8AC3E}">
-        <p14:creationId xmlns:p14="http://schemas.microsoft.com/office/powerpoint/2010/main" val="4231588211"/>
-      </p:ext>
-    </p:extLst>
-  </p:cSld>
-  <p:clrMapOvr>
-    <a:masterClrMapping/>
-  </p:clrMapOvr>
 </p:sld>
 </file>
 

</xml_diff>